<commit_message>
fix typo in templates
</commit_message>
<xml_diff>
--- a/assets/downloads/ieeevr-2023-template-blue.pptx
+++ b/assets/downloads/ieeevr-2023-template-blue.pptx
@@ -224,7 +224,7 @@
           <a:p>
             <a:fld id="{F16B558E-19AF-4C4F-B204-E033384A98D3}" type="datetimeFigureOut">
               <a:rPr lang="en-CN" smtClean="0"/>
-              <a:t>2023/3/9</a:t>
+              <a:t>2023/3/14</a:t>
             </a:fld>
             <a:endParaRPr lang="en-CN"/>
           </a:p>
@@ -480,7 +480,7 @@
           <a:p>
             <a:fld id="{8EA6E1DD-C589-44A4-B774-5C71ED738215}" type="datetimeFigureOut">
               <a:rPr lang="zh-CN" altLang="en-US" smtClean="0"/>
-              <a:t>2023/3/9</a:t>
+              <a:t>2023/3/14</a:t>
             </a:fld>
             <a:endParaRPr lang="zh-CN" altLang="en-US"/>
           </a:p>
@@ -678,7 +678,7 @@
           <a:p>
             <a:fld id="{8EA6E1DD-C589-44A4-B774-5C71ED738215}" type="datetimeFigureOut">
               <a:rPr lang="zh-CN" altLang="en-US" smtClean="0"/>
-              <a:t>2023/3/9</a:t>
+              <a:t>2023/3/14</a:t>
             </a:fld>
             <a:endParaRPr lang="zh-CN" altLang="en-US"/>
           </a:p>
@@ -886,7 +886,7 @@
           <a:p>
             <a:fld id="{8EA6E1DD-C589-44A4-B774-5C71ED738215}" type="datetimeFigureOut">
               <a:rPr lang="zh-CN" altLang="en-US" smtClean="0"/>
-              <a:t>2023/3/9</a:t>
+              <a:t>2023/3/14</a:t>
             </a:fld>
             <a:endParaRPr lang="zh-CN" altLang="en-US"/>
           </a:p>
@@ -1084,7 +1084,7 @@
           <a:p>
             <a:fld id="{8EA6E1DD-C589-44A4-B774-5C71ED738215}" type="datetimeFigureOut">
               <a:rPr lang="zh-CN" altLang="en-US" smtClean="0"/>
-              <a:t>2023/3/9</a:t>
+              <a:t>2023/3/14</a:t>
             </a:fld>
             <a:endParaRPr lang="zh-CN" altLang="en-US"/>
           </a:p>
@@ -1359,7 +1359,7 @@
           <a:p>
             <a:fld id="{8EA6E1DD-C589-44A4-B774-5C71ED738215}" type="datetimeFigureOut">
               <a:rPr lang="zh-CN" altLang="en-US" smtClean="0"/>
-              <a:t>2023/3/9</a:t>
+              <a:t>2023/3/14</a:t>
             </a:fld>
             <a:endParaRPr lang="zh-CN" altLang="en-US"/>
           </a:p>
@@ -1624,7 +1624,7 @@
           <a:p>
             <a:fld id="{8EA6E1DD-C589-44A4-B774-5C71ED738215}" type="datetimeFigureOut">
               <a:rPr lang="zh-CN" altLang="en-US" smtClean="0"/>
-              <a:t>2023/3/9</a:t>
+              <a:t>2023/3/14</a:t>
             </a:fld>
             <a:endParaRPr lang="zh-CN" altLang="en-US"/>
           </a:p>
@@ -2036,7 +2036,7 @@
           <a:p>
             <a:fld id="{8EA6E1DD-C589-44A4-B774-5C71ED738215}" type="datetimeFigureOut">
               <a:rPr lang="zh-CN" altLang="en-US" smtClean="0"/>
-              <a:t>2023/3/9</a:t>
+              <a:t>2023/3/14</a:t>
             </a:fld>
             <a:endParaRPr lang="zh-CN" altLang="en-US"/>
           </a:p>
@@ -2177,7 +2177,7 @@
           <a:p>
             <a:fld id="{8EA6E1DD-C589-44A4-B774-5C71ED738215}" type="datetimeFigureOut">
               <a:rPr lang="zh-CN" altLang="en-US" smtClean="0"/>
-              <a:t>2023/3/9</a:t>
+              <a:t>2023/3/14</a:t>
             </a:fld>
             <a:endParaRPr lang="zh-CN" altLang="en-US"/>
           </a:p>
@@ -2290,7 +2290,7 @@
           <a:p>
             <a:fld id="{8EA6E1DD-C589-44A4-B774-5C71ED738215}" type="datetimeFigureOut">
               <a:rPr lang="zh-CN" altLang="en-US" smtClean="0"/>
-              <a:t>2023/3/9</a:t>
+              <a:t>2023/3/14</a:t>
             </a:fld>
             <a:endParaRPr lang="zh-CN" altLang="en-US"/>
           </a:p>
@@ -2601,7 +2601,7 @@
           <a:p>
             <a:fld id="{8EA6E1DD-C589-44A4-B774-5C71ED738215}" type="datetimeFigureOut">
               <a:rPr lang="zh-CN" altLang="en-US" smtClean="0"/>
-              <a:t>2023/3/9</a:t>
+              <a:t>2023/3/14</a:t>
             </a:fld>
             <a:endParaRPr lang="zh-CN" altLang="en-US"/>
           </a:p>
@@ -2889,7 +2889,7 @@
           <a:p>
             <a:fld id="{8EA6E1DD-C589-44A4-B774-5C71ED738215}" type="datetimeFigureOut">
               <a:rPr lang="zh-CN" altLang="en-US" smtClean="0"/>
-              <a:t>2023/3/9</a:t>
+              <a:t>2023/3/14</a:t>
             </a:fld>
             <a:endParaRPr lang="zh-CN" altLang="en-US"/>
           </a:p>
@@ -3139,7 +3139,7 @@
           <a:p>
             <a:fld id="{8EA6E1DD-C589-44A4-B774-5C71ED738215}" type="datetimeFigureOut">
               <a:rPr lang="zh-CN" altLang="en-US" smtClean="0"/>
-              <a:t>2023/3/9</a:t>
+              <a:t>2023/3/14</a:t>
             </a:fld>
             <a:endParaRPr lang="zh-CN" altLang="en-US"/>
           </a:p>

</xml_diff>